<commit_message>
Book Report New Verion and PPT and some pics
</commit_message>
<xml_diff>
--- a/book_dataset/book-ppt.pptx
+++ b/book_dataset/book-ppt.pptx
@@ -11,11 +11,12 @@
     <p:sldId id="257" r:id="rId3"/>
     <p:sldId id="258" r:id="rId5"/>
     <p:sldId id="259" r:id="rId6"/>
+    <p:sldId id="260" r:id="rId7"/>
   </p:sldIdLst>
   <p:sldSz cx="12192000" cy="6858000"/>
   <p:notesSz cx="6858000" cy="9144000"/>
   <p:custDataLst>
-    <p:tags r:id="rId10"/>
+    <p:tags r:id="rId11"/>
   </p:custDataLst>
   <p:defaultTextStyle>
     <a:defPPr>
@@ -3332,16 +3333,22 @@
           <a:bodyPr/>
           <a:p>
             <a:r>
+              <a:rPr lang="en-US" altLang="zh-CN">
+                <a:sym typeface="+mn-ea"/>
+              </a:rPr>
+              <a:t>A</a:t>
+            </a:r>
+            <a:r>
               <a:rPr lang="zh-CN" altLang="en-US">
                 <a:sym typeface="+mn-ea"/>
               </a:rPr>
-              <a:t>Amazon Book</a:t>
+              <a:t>nalysis</a:t>
             </a:r>
             <a:r>
               <a:rPr lang="en-US" altLang="zh-CN">
                 <a:sym typeface="+mn-ea"/>
               </a:rPr>
-              <a:t>s-</a:t>
+              <a:t> </a:t>
             </a:r>
             <a:r>
               <a:rPr lang="en-US" altLang="zh-CN">
@@ -3395,7 +3402,7 @@
             </a:r>
             <a:r>
               <a:rPr lang="zh-CN" altLang="en-US"/>
-              <a:t>o gather user review data on a wide range of books from Amazon, collecting reviews for each book to make a robust, multi-dimensional analysis analysis</a:t>
+              <a:t>o gather user review data on a wide range of books from Amazon, collecting reviews for each book to make a multi-dimensional analysis</a:t>
             </a:r>
             <a:r>
               <a:rPr lang="en-US" altLang="zh-CN"/>
@@ -3437,18 +3444,6 @@
             <a:r>
               <a:rPr lang="zh-CN" altLang="en-US"/>
               <a:t>Rating Trends: Track how ratings change over time.</a:t>
-            </a:r>
-            <a:endParaRPr lang="zh-CN" altLang="en-US"/>
-          </a:p>
-          <a:p>
-            <a:pPr fontAlgn="auto">
-              <a:lnSpc>
-                <a:spcPct val="100000"/>
-              </a:lnSpc>
-            </a:pPr>
-            <a:r>
-              <a:rPr lang="zh-CN" altLang="en-US"/>
-              <a:t>Detailed Review Insights: Identify strengths and weaknesses of books.</a:t>
             </a:r>
             <a:endParaRPr lang="zh-CN" altLang="en-US"/>
           </a:p>
@@ -3520,7 +3515,7 @@
               <a:rPr lang="en-US" altLang="zh-CN">
                 <a:sym typeface="+mn-ea"/>
               </a:rPr>
-              <a:t>s-</a:t>
+              <a:t>s </a:t>
             </a:r>
             <a:r>
               <a:rPr lang="zh-CN" altLang="en-US">
@@ -3544,11 +3539,21 @@
         </p:nvSpPr>
         <p:spPr/>
         <p:txBody>
-          <a:bodyPr/>
+          <a:bodyPr>
+            <a:normAutofit lnSpcReduction="10000"/>
+          </a:bodyPr>
           <a:p>
             <a:r>
               <a:rPr lang="zh-CN" altLang="en-US"/>
-              <a:t>We collect essential information, including book ID, book title, along with review details like reviewer name, rating, review time, the full review text and so on.</a:t>
+              <a:t>We collect essential information, including book ID, book title, along with review details like reviewer name, rating, review time,</a:t>
+            </a:r>
+            <a:r>
+              <a:rPr lang="en-US" altLang="zh-CN"/>
+              <a:t> helpfulness, </a:t>
+            </a:r>
+            <a:r>
+              <a:rPr lang="zh-CN" altLang="en-US"/>
+              <a:t>the full review text and so on.</a:t>
             </a:r>
             <a:endParaRPr lang="zh-CN" altLang="en-US"/>
           </a:p>
@@ -3563,11 +3568,17 @@
             </a:r>
             <a:r>
               <a:rPr lang="zh-CN" altLang="en-US"/>
-              <a:t>Data stored in a CSV file (Books_rating.csv), ensuring compatibility with analysis tools like Python and Excel.</a:t>
-            </a:r>
-            <a:endParaRPr lang="zh-CN" altLang="en-US"/>
-          </a:p>
-          <a:p>
+              <a:t>Data stored in a CSV file, ensuring compatibility with analysis tools like Python and Excel.</a:t>
+            </a:r>
+            <a:endParaRPr lang="zh-CN" altLang="en-US"/>
+          </a:p>
+          <a:p>
+            <a:endParaRPr lang="zh-CN" altLang="en-US"/>
+          </a:p>
+          <a:p>
+            <a:pPr marL="0" indent="0">
+              <a:buNone/>
+            </a:pPr>
             <a:r>
               <a:rPr lang="en-US" altLang="zh-CN"/>
               <a:t>O</a:t>
@@ -3582,11 +3593,31 @@
             </a:r>
             <a:r>
               <a:rPr lang="zh-CN" altLang="en-US"/>
-              <a:t>anti-scraping measures</a:t>
+              <a:t>anti-scraping</a:t>
             </a:r>
             <a:r>
               <a:rPr lang="en-US" altLang="zh-CN"/>
-              <a:t>: We choose to simulate real user behavior. This includes using multiple User-Agent strings and adding random delays between requests to reduce the risk of detection and blocking.</a:t>
+              <a:t>: We simulated real user behavior </a:t>
+            </a:r>
+            <a:r>
+              <a:rPr lang="en-US" altLang="zh-CN">
+                <a:sym typeface="+mn-ea"/>
+              </a:rPr>
+              <a:t>to reduce the risk of detection and blocking.</a:t>
+            </a:r>
+            <a:endParaRPr lang="en-US" altLang="zh-CN"/>
+          </a:p>
+          <a:p>
+            <a:r>
+              <a:rPr lang="en-US" altLang="zh-CN"/>
+              <a:t>Use multiple User-Agent strings</a:t>
+            </a:r>
+            <a:endParaRPr lang="en-US" altLang="zh-CN"/>
+          </a:p>
+          <a:p>
+            <a:r>
+              <a:rPr lang="en-US" altLang="zh-CN"/>
+              <a:t>Add random delays between requests</a:t>
             </a:r>
             <a:endParaRPr lang="en-US" altLang="zh-CN"/>
           </a:p>
@@ -3634,7 +3665,7 @@
               <a:rPr lang="en-US" altLang="zh-CN">
                 <a:sym typeface="+mn-ea"/>
               </a:rPr>
-              <a:t>s-</a:t>
+              <a:t>s </a:t>
             </a:r>
             <a:r>
               <a:rPr lang="zh-CN" altLang="en-US"/>
@@ -3741,12 +3772,164 @@
             </a:r>
             <a:r>
               <a:rPr lang="zh-CN" altLang="en-US"/>
-              <a:t>ready for deeper analysis, sentiment tracking, and trend analysis. This step is key to understanding user feedback and setting the foundation for further exploration.</a:t>
-            </a:r>
-            <a:endParaRPr lang="zh-CN" altLang="en-US"/>
-          </a:p>
-        </p:txBody>
-      </p:sp>
+              <a:t>ready for deeper analysis, </a:t>
+            </a:r>
+            <a:r>
+              <a:rPr lang="en-US" altLang="zh-CN"/>
+              <a:t>like </a:t>
+            </a:r>
+            <a:r>
+              <a:rPr lang="zh-CN" altLang="en-US"/>
+              <a:t>sentiment tracking,  trend analysis</a:t>
+            </a:r>
+            <a:r>
+              <a:rPr lang="en-US" altLang="zh-CN"/>
+              <a:t> and so on</a:t>
+            </a:r>
+            <a:r>
+              <a:rPr lang="zh-CN" altLang="en-US"/>
+              <a:t>. </a:t>
+            </a:r>
+            <a:endParaRPr lang="zh-CN" altLang="en-US"/>
+          </a:p>
+        </p:txBody>
+      </p:sp>
+    </p:spTree>
+  </p:cSld>
+  <p:clrMapOvr>
+    <a:masterClrMapping/>
+  </p:clrMapOvr>
+</p:sld>
+</file>
+
+<file path=ppt/slides/slide4.xml><?xml version="1.0" encoding="utf-8"?>
+<p:sld xmlns:a="http://schemas.openxmlformats.org/drawingml/2006/main" xmlns:r="http://schemas.openxmlformats.org/officeDocument/2006/relationships" xmlns:p="http://schemas.openxmlformats.org/presentationml/2006/main">
+  <p:cSld>
+    <p:spTree>
+      <p:nvGrpSpPr>
+        <p:cNvPr id="1" name=""/>
+        <p:cNvGrpSpPr/>
+        <p:nvPr/>
+      </p:nvGrpSpPr>
+      <p:grpSpPr/>
+      <p:sp>
+        <p:nvSpPr>
+          <p:cNvPr id="2" name="标题 1"/>
+          <p:cNvSpPr>
+            <a:spLocks noGrp="1"/>
+          </p:cNvSpPr>
+          <p:nvPr>
+            <p:ph type="title"/>
+          </p:nvPr>
+        </p:nvSpPr>
+        <p:spPr/>
+        <p:txBody>
+          <a:bodyPr/>
+          <a:p>
+            <a:r>
+              <a:rPr lang="en-US" altLang="zh-CN"/>
+              <a:t>Data Analysis Example</a:t>
+            </a:r>
+            <a:endParaRPr lang="en-US" altLang="zh-CN"/>
+          </a:p>
+        </p:txBody>
+      </p:sp>
+      <p:sp>
+        <p:nvSpPr>
+          <p:cNvPr id="3" name="内容占位符 2"/>
+          <p:cNvSpPr>
+            <a:spLocks noGrp="1"/>
+          </p:cNvSpPr>
+          <p:nvPr>
+            <p:ph idx="1"/>
+          </p:nvPr>
+        </p:nvSpPr>
+        <p:spPr>
+          <a:xfrm>
+            <a:off x="5530850" y="1691005"/>
+            <a:ext cx="6311265" cy="4182110"/>
+          </a:xfrm>
+        </p:spPr>
+        <p:txBody>
+          <a:bodyPr>
+            <a:normAutofit lnSpcReduction="10000"/>
+          </a:bodyPr>
+          <a:p>
+            <a:pPr marL="0" indent="0">
+              <a:buNone/>
+            </a:pPr>
+            <a:r>
+              <a:rPr lang="en-US" altLang="zh-CN"/>
+              <a:t>This bar chart shows the average helpfulness ratio of book reviews across different ratings. </a:t>
+            </a:r>
+            <a:endParaRPr lang="en-US" altLang="zh-CN"/>
+          </a:p>
+          <a:p>
+            <a:pPr marL="0" indent="0">
+              <a:buNone/>
+            </a:pPr>
+            <a:r>
+              <a:rPr lang="en-US" altLang="zh-CN"/>
+              <a:t>High star ratings: high average helpfulness ratio, indicating that users generally find positive reviews more helpful or reliable. </a:t>
+            </a:r>
+            <a:endParaRPr lang="en-US" altLang="zh-CN"/>
+          </a:p>
+          <a:p>
+            <a:pPr marL="0" indent="0">
+              <a:buNone/>
+            </a:pPr>
+            <a:r>
+              <a:rPr lang="en-US" altLang="zh-CN"/>
+              <a:t>Low </a:t>
+            </a:r>
+            <a:r>
+              <a:rPr lang="en-US" altLang="zh-CN">
+                <a:sym typeface="+mn-ea"/>
+              </a:rPr>
+              <a:t>star ratings:</a:t>
+            </a:r>
+            <a:r>
+              <a:rPr lang="en-US" altLang="zh-CN"/>
+              <a:t> </a:t>
+            </a:r>
+            <a:r>
+              <a:rPr lang="en-US" altLang="zh-CN">
+                <a:sym typeface="+mn-ea"/>
+              </a:rPr>
+              <a:t>low helpfulness ratio</a:t>
+            </a:r>
+            <a:r>
+              <a:rPr lang="en-US" altLang="zh-CN"/>
+              <a:t>, meaning that negative feedback may be viewed as less constructive or subjective.</a:t>
+            </a:r>
+            <a:endParaRPr lang="en-US" altLang="zh-CN"/>
+          </a:p>
+        </p:txBody>
+      </p:sp>
+      <p:pic>
+        <p:nvPicPr>
+          <p:cNvPr id="4" name="图片 2" descr="Average Helpfulness Ratio by Score"/>
+          <p:cNvPicPr>
+            <a:picLocks noChangeAspect="1"/>
+          </p:cNvPicPr>
+          <p:nvPr/>
+        </p:nvPicPr>
+        <p:blipFill>
+          <a:blip r:embed="rId1"/>
+          <a:stretch>
+            <a:fillRect/>
+          </a:stretch>
+        </p:blipFill>
+        <p:spPr>
+          <a:xfrm>
+            <a:off x="278130" y="1521460"/>
+            <a:ext cx="5164455" cy="4126865"/>
+          </a:xfrm>
+          <a:prstGeom prst="rect">
+            <a:avLst/>
+          </a:prstGeom>
+        </p:spPr>
+      </p:pic>
     </p:spTree>
   </p:cSld>
   <p:clrMapOvr>

</xml_diff>